<commit_message>
updates for microservices 101, 102 and 103
</commit_message>
<xml_diff>
--- a/Presentatie/Microservices 101 20190802.pptx
+++ b/Presentatie/Microservices 101 20190802.pptx
@@ -5386,12 +5386,8 @@
               </a:spcAft>
             </a:pPr>
             <a:r>
-              <a:rPr lang="nl-NL" dirty="0"/>
-              <a:t>Microservices-</a:t>
-            </a:r>
-            <a:r>
               <a:rPr lang="nl-NL" dirty="0" err="1"/>
-              <a:t>architecture</a:t>
+              <a:t>Microservicesarchitecture</a:t>
             </a:r>
             <a:endParaRPr lang="nl-NL" dirty="0"/>
           </a:p>
@@ -6573,7 +6569,7 @@
         <p:spPr>
           <a:xfrm>
             <a:off x="1245415" y="1709306"/>
-            <a:ext cx="1535870" cy="369332"/>
+            <a:ext cx="1481688" cy="369332"/>
           </a:xfrm>
           <a:prstGeom prst="rect">
             <a:avLst/>
@@ -6588,7 +6584,7 @@
           <a:p>
             <a:r>
               <a:rPr lang="nl-NL" dirty="0"/>
-              <a:t>customer data</a:t>
+              <a:t>customer info</a:t>
             </a:r>
           </a:p>
         </p:txBody>
@@ -6764,7 +6760,7 @@
         <p:spPr>
           <a:xfrm>
             <a:off x="567235" y="1709306"/>
-            <a:ext cx="1568571" cy="369332"/>
+            <a:ext cx="1481688" cy="369332"/>
           </a:xfrm>
           <a:prstGeom prst="rect">
             <a:avLst/>
@@ -6779,7 +6775,7 @@
           <a:p>
             <a:r>
               <a:rPr lang="nl-NL" dirty="0"/>
-              <a:t>customer data</a:t>
+              <a:t>customer info</a:t>
             </a:r>
           </a:p>
         </p:txBody>
@@ -12949,9 +12945,12 @@
 </file>
 
 <file path=customXml/item1.xml><?xml version="1.0" encoding="utf-8"?>
-<p:properties xmlns:p="http://schemas.microsoft.com/office/2006/metadata/properties" xmlns:xsi="http://www.w3.org/2001/XMLSchema-instance" xmlns:pc="http://schemas.microsoft.com/office/infopath/2007/PartnerControls">
-  <documentManagement/>
-</p:properties>
+<?mso-contentType ?>
+<FormTemplates xmlns="http://schemas.microsoft.com/sharepoint/v3/contenttype/forms">
+  <Display>DocumentLibraryForm</Display>
+  <Edit>DocumentLibraryForm</Edit>
+  <New>DocumentLibraryForm</New>
+</FormTemplates>
 </file>
 
 <file path=customXml/item2.xml><?xml version="1.0" encoding="utf-8"?>
@@ -13069,19 +13068,15 @@
 </file>
 
 <file path=customXml/item3.xml><?xml version="1.0" encoding="utf-8"?>
-<?mso-contentType ?>
-<FormTemplates xmlns="http://schemas.microsoft.com/sharepoint/v3/contenttype/forms">
-  <Display>DocumentLibraryForm</Display>
-  <Edit>DocumentLibraryForm</Edit>
-  <New>DocumentLibraryForm</New>
-</FormTemplates>
+<p:properties xmlns:p="http://schemas.microsoft.com/office/2006/metadata/properties" xmlns:xsi="http://www.w3.org/2001/XMLSchema-instance" xmlns:pc="http://schemas.microsoft.com/office/infopath/2007/PartnerControls">
+  <documentManagement/>
+</p:properties>
 </file>
 
 <file path=customXml/itemProps1.xml><?xml version="1.0" encoding="utf-8"?>
-<ds:datastoreItem xmlns:ds="http://schemas.openxmlformats.org/officeDocument/2006/customXml" ds:itemID="{DE0A3E1F-B2EC-4B36-9F71-3169FFDE4AE0}">
+<ds:datastoreItem xmlns:ds="http://schemas.openxmlformats.org/officeDocument/2006/customXml" ds:itemID="{4A752D92-0ACC-48D2-A658-AB744FE70ECE}">
   <ds:schemaRefs>
-    <ds:schemaRef ds:uri="http://schemas.microsoft.com/office/2006/metadata/properties"/>
-    <ds:schemaRef ds:uri="http://schemas.microsoft.com/office/infopath/2007/PartnerControls"/>
+    <ds:schemaRef ds:uri="http://schemas.microsoft.com/sharepoint/v3/contenttype/forms"/>
   </ds:schemaRefs>
 </ds:datastoreItem>
 </file>
@@ -13103,9 +13098,10 @@
 </file>
 
 <file path=customXml/itemProps3.xml><?xml version="1.0" encoding="utf-8"?>
-<ds:datastoreItem xmlns:ds="http://schemas.openxmlformats.org/officeDocument/2006/customXml" ds:itemID="{4A752D92-0ACC-48D2-A658-AB744FE70ECE}">
+<ds:datastoreItem xmlns:ds="http://schemas.openxmlformats.org/officeDocument/2006/customXml" ds:itemID="{DE0A3E1F-B2EC-4B36-9F71-3169FFDE4AE0}">
   <ds:schemaRefs>
-    <ds:schemaRef ds:uri="http://schemas.microsoft.com/sharepoint/v3/contenttype/forms"/>
+    <ds:schemaRef ds:uri="http://schemas.microsoft.com/office/2006/metadata/properties"/>
+    <ds:schemaRef ds:uri="http://schemas.microsoft.com/office/infopath/2007/PartnerControls"/>
   </ds:schemaRefs>
 </ds:datastoreItem>
 </file>
</xml_diff>